<commit_message>
small change of fig
</commit_message>
<xml_diff>
--- a/bivariate_probit_model/fig/ppt.pptx
+++ b/bivariate_probit_model/fig/ppt.pptx
@@ -3814,10 +3814,10 @@
       </p:sp>
       <p:grpSp>
         <p:nvGrpSpPr>
-          <p:cNvPr id="75" name="グループ化 74">
+          <p:cNvPr id="2" name="グループ化 1">
             <a:extLst>
               <a:ext uri="{FF2B5EF4-FFF2-40B4-BE49-F238E27FC236}">
-                <a16:creationId xmlns:a16="http://schemas.microsoft.com/office/drawing/2014/main" id="{9656DFF6-7A55-6503-F71F-CC2F9C88544A}"/>
+                <a16:creationId xmlns:a16="http://schemas.microsoft.com/office/drawing/2014/main" id="{8B94132E-C2B6-9019-64E5-86D8A5F57850}"/>
               </a:ext>
             </a:extLst>
           </p:cNvPr>
@@ -3826,10 +3826,10 @@
         </p:nvGrpSpPr>
         <p:grpSpPr>
           <a:xfrm>
-            <a:off x="1127448" y="260647"/>
-            <a:ext cx="5112568" cy="3873007"/>
-            <a:chOff x="1127448" y="260647"/>
-            <a:chExt cx="5112568" cy="3873007"/>
+            <a:off x="1418840" y="2420888"/>
+            <a:ext cx="10509808" cy="3963451"/>
+            <a:chOff x="1418840" y="2420888"/>
+            <a:chExt cx="10509808" cy="3963451"/>
           </a:xfrm>
         </p:grpSpPr>
         <p:sp>
@@ -3846,8 +3846,8 @@
           </p:nvSpPr>
           <p:spPr>
             <a:xfrm>
-              <a:off x="1127448" y="260647"/>
-              <a:ext cx="5112568" cy="3873007"/>
+              <a:off x="1418840" y="2420888"/>
+              <a:ext cx="10509808" cy="3963451"/>
             </a:xfrm>
             <a:prstGeom prst="rect">
               <a:avLst/>
@@ -3898,7 +3898,7 @@
           </p:nvSpPr>
           <p:spPr>
             <a:xfrm rot="18900000">
-              <a:off x="1590411" y="1727990"/>
+              <a:off x="1881803" y="3978675"/>
               <a:ext cx="2686990" cy="1656184"/>
             </a:xfrm>
             <a:custGeom>
@@ -4019,7 +4019,7 @@
           </p:nvCxnSpPr>
           <p:spPr>
             <a:xfrm>
-              <a:off x="1487488" y="2492896"/>
+              <a:off x="1778880" y="4743581"/>
               <a:ext cx="4608512" cy="0"/>
             </a:xfrm>
             <a:prstGeom prst="line">
@@ -4066,7 +4066,7 @@
           </p:nvCxnSpPr>
           <p:spPr>
             <a:xfrm flipV="1">
-              <a:off x="2999656" y="404664"/>
+              <a:off x="3291048" y="2655349"/>
               <a:ext cx="0" cy="3512437"/>
             </a:xfrm>
             <a:prstGeom prst="line">
@@ -4113,7 +4113,7 @@
           </p:nvCxnSpPr>
           <p:spPr>
             <a:xfrm>
-              <a:off x="3591736" y="490194"/>
+              <a:off x="3883128" y="2740879"/>
               <a:ext cx="0" cy="3403076"/>
             </a:xfrm>
             <a:prstGeom prst="line">
@@ -4156,7 +4156,7 @@
               </p:nvSpPr>
               <p:spPr>
                 <a:xfrm>
-                  <a:off x="3991843" y="1405195"/>
+                  <a:off x="4283235" y="3655880"/>
                   <a:ext cx="1398524" cy="523220"/>
                 </a:xfrm>
                 <a:prstGeom prst="rect">
@@ -4170,6 +4170,7 @@
                 </a:bodyPr>
                 <a:lstStyle/>
                 <a:p>
+                  <a:pPr/>
                   <a14:m>
                     <m:oMathPara xmlns:m="http://schemas.openxmlformats.org/officeDocument/2006/math">
                       <m:oMathParaPr>
@@ -4268,7 +4269,7 @@
               </p:nvSpPr>
               <p:spPr>
                 <a:xfrm>
-                  <a:off x="3991843" y="1405195"/>
+                  <a:off x="4283235" y="3655880"/>
                   <a:ext cx="1398524" cy="523220"/>
                 </a:xfrm>
                 <a:prstGeom prst="rect">
@@ -4312,7 +4313,7 @@
           </p:nvCxnSpPr>
           <p:spPr>
             <a:xfrm>
-              <a:off x="1509389" y="2127447"/>
+              <a:off x="1800781" y="4378132"/>
               <a:ext cx="4464496" cy="0"/>
             </a:xfrm>
             <a:prstGeom prst="line">
@@ -4353,7 +4354,7 @@
           </p:nvSpPr>
           <p:spPr>
             <a:xfrm rot="18900000">
-              <a:off x="2942867" y="1507328"/>
+              <a:off x="3234259" y="3758013"/>
               <a:ext cx="1434440" cy="1241110"/>
             </a:xfrm>
             <a:custGeom>
@@ -4464,7 +4465,7 @@
           </p:nvSpPr>
           <p:spPr>
             <a:xfrm>
-              <a:off x="3516785" y="2046391"/>
+              <a:off x="3808177" y="4297076"/>
               <a:ext cx="149901" cy="162111"/>
             </a:xfrm>
             <a:prstGeom prst="ellipse">
@@ -4499,79 +4500,6 @@
             <a:p>
               <a:pPr algn="ctr"/>
               <a:endParaRPr kumimoji="1" lang="ja-JP" altLang="en-US"/>
-            </a:p>
-          </p:txBody>
-        </p:sp>
-      </p:grpSp>
-      <p:grpSp>
-        <p:nvGrpSpPr>
-          <p:cNvPr id="74" name="グループ化 73">
-            <a:extLst>
-              <a:ext uri="{FF2B5EF4-FFF2-40B4-BE49-F238E27FC236}">
-                <a16:creationId xmlns:a16="http://schemas.microsoft.com/office/drawing/2014/main" id="{05FDB7A0-D29B-05B8-A292-123230007A25}"/>
-              </a:ext>
-            </a:extLst>
-          </p:cNvPr>
-          <p:cNvGrpSpPr/>
-          <p:nvPr/>
-        </p:nvGrpSpPr>
-        <p:grpSpPr>
-          <a:xfrm>
-            <a:off x="6764677" y="2494800"/>
-            <a:ext cx="5112568" cy="3873007"/>
-            <a:chOff x="6764677" y="2494800"/>
-            <a:chExt cx="5112568" cy="3873007"/>
-          </a:xfrm>
-        </p:grpSpPr>
-        <p:sp>
-          <p:nvSpPr>
-            <p:cNvPr id="59" name="正方形/長方形 58">
-              <a:extLst>
-                <a:ext uri="{FF2B5EF4-FFF2-40B4-BE49-F238E27FC236}">
-                  <a16:creationId xmlns:a16="http://schemas.microsoft.com/office/drawing/2014/main" id="{D707AE78-4D74-FA4F-EA45-A0EABC6719C3}"/>
-                </a:ext>
-              </a:extLst>
-            </p:cNvPr>
-            <p:cNvSpPr/>
-            <p:nvPr/>
-          </p:nvSpPr>
-          <p:spPr>
-            <a:xfrm>
-              <a:off x="6764677" y="2494800"/>
-              <a:ext cx="5112568" cy="3873007"/>
-            </a:xfrm>
-            <a:prstGeom prst="rect">
-              <a:avLst/>
-            </a:prstGeom>
-            <a:solidFill>
-              <a:schemeClr val="bg1"/>
-            </a:solidFill>
-            <a:ln>
-              <a:noFill/>
-            </a:ln>
-          </p:spPr>
-          <p:style>
-            <a:lnRef idx="2">
-              <a:schemeClr val="accent1">
-                <a:shade val="15000"/>
-              </a:schemeClr>
-            </a:lnRef>
-            <a:fillRef idx="1">
-              <a:schemeClr val="accent1"/>
-            </a:fillRef>
-            <a:effectRef idx="0">
-              <a:schemeClr val="accent1"/>
-            </a:effectRef>
-            <a:fontRef idx="minor">
-              <a:schemeClr val="lt1"/>
-            </a:fontRef>
-          </p:style>
-          <p:txBody>
-            <a:bodyPr rtlCol="0" anchor="ctr"/>
-            <a:lstStyle/>
-            <a:p>
-              <a:pPr algn="ctr"/>
-              <a:endParaRPr kumimoji="1" lang="ja-JP" altLang="en-US" dirty="0"/>
             </a:p>
           </p:txBody>
         </p:sp>
@@ -4859,6 +4787,7 @@
                 </a:bodyPr>
                 <a:lstStyle/>
                 <a:p>
+                  <a:pPr/>
                   <a14:m>
                     <m:oMathPara xmlns:m="http://schemas.openxmlformats.org/officeDocument/2006/math">
                       <m:oMathParaPr>

</xml_diff>